<commit_message>
fix: input int to float for duration filter
</commit_message>
<xml_diff>
--- a/doc/screenshots.pptx
+++ b/doc/screenshots.pptx
@@ -5,7 +5,7 @@
     <p:sldMasterId id="2147483648" r:id="rId1"/>
   </p:sldMasterIdLst>
   <p:notesMasterIdLst>
-    <p:notesMasterId r:id="rId8"/>
+    <p:notesMasterId r:id="rId9"/>
   </p:notesMasterIdLst>
   <p:sldIdLst>
     <p:sldId id="261" r:id="rId2"/>
@@ -14,6 +14,7 @@
     <p:sldId id="259" r:id="rId5"/>
     <p:sldId id="257" r:id="rId6"/>
     <p:sldId id="258" r:id="rId7"/>
+    <p:sldId id="262" r:id="rId8"/>
   </p:sldIdLst>
   <p:sldSz cx="12192000" cy="6858000"/>
   <p:notesSz cx="6858000" cy="9144000"/>
@@ -202,7 +203,7 @@
           <a:p>
             <a:fld id="{E36CAFB9-D2F2-494A-9513-78684149591B}" type="datetimeFigureOut">
               <a:rPr lang="en-SG" smtClean="0"/>
-              <a:t>13/3/2025</a:t>
+              <a:t>22/5/2025</a:t>
             </a:fld>
             <a:endParaRPr lang="en-SG"/>
           </a:p>
@@ -703,7 +704,7 @@
           <a:p>
             <a:fld id="{19D6510E-A692-4F30-A92C-C3103839909E}" type="datetimeFigureOut">
               <a:rPr lang="en-SG" smtClean="0"/>
-              <a:t>13/3/2025</a:t>
+              <a:t>22/5/2025</a:t>
             </a:fld>
             <a:endParaRPr lang="en-SG"/>
           </a:p>
@@ -903,7 +904,7 @@
           <a:p>
             <a:fld id="{19D6510E-A692-4F30-A92C-C3103839909E}" type="datetimeFigureOut">
               <a:rPr lang="en-SG" smtClean="0"/>
-              <a:t>13/3/2025</a:t>
+              <a:t>22/5/2025</a:t>
             </a:fld>
             <a:endParaRPr lang="en-SG"/>
           </a:p>
@@ -1113,7 +1114,7 @@
           <a:p>
             <a:fld id="{19D6510E-A692-4F30-A92C-C3103839909E}" type="datetimeFigureOut">
               <a:rPr lang="en-SG" smtClean="0"/>
-              <a:t>13/3/2025</a:t>
+              <a:t>22/5/2025</a:t>
             </a:fld>
             <a:endParaRPr lang="en-SG"/>
           </a:p>
@@ -1313,7 +1314,7 @@
           <a:p>
             <a:fld id="{19D6510E-A692-4F30-A92C-C3103839909E}" type="datetimeFigureOut">
               <a:rPr lang="en-SG" smtClean="0"/>
-              <a:t>13/3/2025</a:t>
+              <a:t>22/5/2025</a:t>
             </a:fld>
             <a:endParaRPr lang="en-SG"/>
           </a:p>
@@ -1589,7 +1590,7 @@
           <a:p>
             <a:fld id="{19D6510E-A692-4F30-A92C-C3103839909E}" type="datetimeFigureOut">
               <a:rPr lang="en-SG" smtClean="0"/>
-              <a:t>13/3/2025</a:t>
+              <a:t>22/5/2025</a:t>
             </a:fld>
             <a:endParaRPr lang="en-SG"/>
           </a:p>
@@ -1857,7 +1858,7 @@
           <a:p>
             <a:fld id="{19D6510E-A692-4F30-A92C-C3103839909E}" type="datetimeFigureOut">
               <a:rPr lang="en-SG" smtClean="0"/>
-              <a:t>13/3/2025</a:t>
+              <a:t>22/5/2025</a:t>
             </a:fld>
             <a:endParaRPr lang="en-SG"/>
           </a:p>
@@ -2272,7 +2273,7 @@
           <a:p>
             <a:fld id="{19D6510E-A692-4F30-A92C-C3103839909E}" type="datetimeFigureOut">
               <a:rPr lang="en-SG" smtClean="0"/>
-              <a:t>13/3/2025</a:t>
+              <a:t>22/5/2025</a:t>
             </a:fld>
             <a:endParaRPr lang="en-SG"/>
           </a:p>
@@ -2414,7 +2415,7 @@
           <a:p>
             <a:fld id="{19D6510E-A692-4F30-A92C-C3103839909E}" type="datetimeFigureOut">
               <a:rPr lang="en-SG" smtClean="0"/>
-              <a:t>13/3/2025</a:t>
+              <a:t>22/5/2025</a:t>
             </a:fld>
             <a:endParaRPr lang="en-SG"/>
           </a:p>
@@ -2527,7 +2528,7 @@
           <a:p>
             <a:fld id="{19D6510E-A692-4F30-A92C-C3103839909E}" type="datetimeFigureOut">
               <a:rPr lang="en-SG" smtClean="0"/>
-              <a:t>13/3/2025</a:t>
+              <a:t>22/5/2025</a:t>
             </a:fld>
             <a:endParaRPr lang="en-SG"/>
           </a:p>
@@ -2840,7 +2841,7 @@
           <a:p>
             <a:fld id="{19D6510E-A692-4F30-A92C-C3103839909E}" type="datetimeFigureOut">
               <a:rPr lang="en-SG" smtClean="0"/>
-              <a:t>13/3/2025</a:t>
+              <a:t>22/5/2025</a:t>
             </a:fld>
             <a:endParaRPr lang="en-SG"/>
           </a:p>
@@ -3129,7 +3130,7 @@
           <a:p>
             <a:fld id="{19D6510E-A692-4F30-A92C-C3103839909E}" type="datetimeFigureOut">
               <a:rPr lang="en-SG" smtClean="0"/>
-              <a:t>13/3/2025</a:t>
+              <a:t>22/5/2025</a:t>
             </a:fld>
             <a:endParaRPr lang="en-SG"/>
           </a:p>
@@ -3372,7 +3373,7 @@
           <a:p>
             <a:fld id="{19D6510E-A692-4F30-A92C-C3103839909E}" type="datetimeFigureOut">
               <a:rPr lang="en-SG" smtClean="0"/>
-              <a:t>13/3/2025</a:t>
+              <a:t>22/5/2025</a:t>
             </a:fld>
             <a:endParaRPr lang="en-SG"/>
           </a:p>
@@ -8503,6 +8504,244 @@
     <p:extLst>
       <p:ext uri="{BB962C8B-B14F-4D97-AF65-F5344CB8AC3E}">
         <p14:creationId xmlns:p14="http://schemas.microsoft.com/office/powerpoint/2010/main" val="3593158269"/>
+      </p:ext>
+    </p:extLst>
+  </p:cSld>
+  <p:clrMapOvr>
+    <a:masterClrMapping/>
+  </p:clrMapOvr>
+</p:sld>
+</file>
+
+<file path=ppt/slides/slide7.xml><?xml version="1.0" encoding="utf-8"?>
+<p:sld xmlns:a="http://schemas.openxmlformats.org/drawingml/2006/main" xmlns:r="http://schemas.openxmlformats.org/officeDocument/2006/relationships" xmlns:p="http://schemas.openxmlformats.org/presentationml/2006/main">
+  <p:cSld>
+    <p:spTree>
+      <p:nvGrpSpPr>
+        <p:cNvPr id="1" name=""/>
+        <p:cNvGrpSpPr/>
+        <p:nvPr/>
+      </p:nvGrpSpPr>
+      <p:grpSpPr>
+        <a:xfrm>
+          <a:off x="0" y="0"/>
+          <a:ext cx="0" cy="0"/>
+          <a:chOff x="0" y="0"/>
+          <a:chExt cx="0" cy="0"/>
+        </a:xfrm>
+      </p:grpSpPr>
+      <p:pic>
+        <p:nvPicPr>
+          <p:cNvPr id="5" name="Picture 4">
+            <a:extLst>
+              <a:ext uri="{FF2B5EF4-FFF2-40B4-BE49-F238E27FC236}">
+                <a16:creationId xmlns:a16="http://schemas.microsoft.com/office/drawing/2014/main" id="{6779869C-C68F-CCF9-0112-D86928B98802}"/>
+              </a:ext>
+            </a:extLst>
+          </p:cNvPr>
+          <p:cNvPicPr>
+            <a:picLocks noChangeAspect="1"/>
+          </p:cNvPicPr>
+          <p:nvPr/>
+        </p:nvPicPr>
+        <p:blipFill>
+          <a:blip r:embed="rId2"/>
+          <a:stretch>
+            <a:fillRect/>
+          </a:stretch>
+        </p:blipFill>
+        <p:spPr>
+          <a:xfrm>
+            <a:off x="0" y="68766"/>
+            <a:ext cx="12192000" cy="6720468"/>
+          </a:xfrm>
+          <a:prstGeom prst="rect">
+            <a:avLst/>
+          </a:prstGeom>
+        </p:spPr>
+      </p:pic>
+      <p:cxnSp>
+        <p:nvCxnSpPr>
+          <p:cNvPr id="7" name="Straight Connector 6">
+            <a:extLst>
+              <a:ext uri="{FF2B5EF4-FFF2-40B4-BE49-F238E27FC236}">
+                <a16:creationId xmlns:a16="http://schemas.microsoft.com/office/drawing/2014/main" id="{3FAD1C64-0412-DBC6-3B39-5FC71247E10F}"/>
+              </a:ext>
+            </a:extLst>
+          </p:cNvPr>
+          <p:cNvCxnSpPr>
+            <a:cxnSpLocks/>
+          </p:cNvCxnSpPr>
+          <p:nvPr/>
+        </p:nvCxnSpPr>
+        <p:spPr>
+          <a:xfrm>
+            <a:off x="6926580" y="4009929"/>
+            <a:ext cx="975360" cy="1157335"/>
+          </a:xfrm>
+          <a:prstGeom prst="line">
+            <a:avLst/>
+          </a:prstGeom>
+          <a:ln>
+            <a:solidFill>
+              <a:srgbClr val="FFC000"/>
+            </a:solidFill>
+          </a:ln>
+        </p:spPr>
+        <p:style>
+          <a:lnRef idx="2">
+            <a:schemeClr val="accent1"/>
+          </a:lnRef>
+          <a:fillRef idx="0">
+            <a:schemeClr val="accent1"/>
+          </a:fillRef>
+          <a:effectRef idx="1">
+            <a:schemeClr val="accent1"/>
+          </a:effectRef>
+          <a:fontRef idx="minor">
+            <a:schemeClr val="tx1"/>
+          </a:fontRef>
+        </p:style>
+      </p:cxnSp>
+      <p:sp>
+        <p:nvSpPr>
+          <p:cNvPr id="8" name="TextBox 7">
+            <a:extLst>
+              <a:ext uri="{FF2B5EF4-FFF2-40B4-BE49-F238E27FC236}">
+                <a16:creationId xmlns:a16="http://schemas.microsoft.com/office/drawing/2014/main" id="{1F6EEF25-09A4-55A9-FD3B-CE8EF581EA36}"/>
+              </a:ext>
+            </a:extLst>
+          </p:cNvPr>
+          <p:cNvSpPr txBox="1"/>
+          <p:nvPr/>
+        </p:nvSpPr>
+        <p:spPr>
+          <a:xfrm>
+            <a:off x="7231380" y="5321000"/>
+            <a:ext cx="2736390" cy="492443"/>
+          </a:xfrm>
+          <a:prstGeom prst="rect">
+            <a:avLst/>
+          </a:prstGeom>
+          <a:noFill/>
+        </p:spPr>
+        <p:txBody>
+          <a:bodyPr wrap="none" rtlCol="0">
+            <a:spAutoFit/>
+          </a:bodyPr>
+          <a:lstStyle/>
+          <a:p>
+            <a:r>
+              <a:rPr lang="en-SG" sz="1300" dirty="0">
+                <a:solidFill>
+                  <a:srgbClr val="FFC000"/>
+                </a:solidFill>
+              </a:rPr>
+              <a:t>panning: hold Left mouse and move</a:t>
+            </a:r>
+          </a:p>
+          <a:p>
+            <a:r>
+              <a:rPr lang="en-SG" sz="1300" dirty="0">
+                <a:solidFill>
+                  <a:srgbClr val="FFC000"/>
+                </a:solidFill>
+              </a:rPr>
+              <a:t>zoom in/out: mouse scroll up/down</a:t>
+            </a:r>
+          </a:p>
+        </p:txBody>
+      </p:sp>
+      <p:cxnSp>
+        <p:nvCxnSpPr>
+          <p:cNvPr id="12" name="Straight Connector 11">
+            <a:extLst>
+              <a:ext uri="{FF2B5EF4-FFF2-40B4-BE49-F238E27FC236}">
+                <a16:creationId xmlns:a16="http://schemas.microsoft.com/office/drawing/2014/main" id="{82172DB2-6EF0-96D7-2286-290898461036}"/>
+              </a:ext>
+            </a:extLst>
+          </p:cNvPr>
+          <p:cNvCxnSpPr>
+            <a:cxnSpLocks/>
+          </p:cNvCxnSpPr>
+          <p:nvPr/>
+        </p:nvCxnSpPr>
+        <p:spPr>
+          <a:xfrm>
+            <a:off x="5829300" y="4832889"/>
+            <a:ext cx="1249680" cy="668751"/>
+          </a:xfrm>
+          <a:prstGeom prst="line">
+            <a:avLst/>
+          </a:prstGeom>
+          <a:ln>
+            <a:solidFill>
+              <a:srgbClr val="FFC000"/>
+            </a:solidFill>
+          </a:ln>
+        </p:spPr>
+        <p:style>
+          <a:lnRef idx="2">
+            <a:schemeClr val="accent1"/>
+          </a:lnRef>
+          <a:fillRef idx="0">
+            <a:schemeClr val="accent1"/>
+          </a:fillRef>
+          <a:effectRef idx="1">
+            <a:schemeClr val="accent1"/>
+          </a:effectRef>
+          <a:fontRef idx="minor">
+            <a:schemeClr val="tx1"/>
+          </a:fontRef>
+        </p:style>
+      </p:cxnSp>
+      <p:cxnSp>
+        <p:nvCxnSpPr>
+          <p:cNvPr id="16" name="Straight Connector 15">
+            <a:extLst>
+              <a:ext uri="{FF2B5EF4-FFF2-40B4-BE49-F238E27FC236}">
+                <a16:creationId xmlns:a16="http://schemas.microsoft.com/office/drawing/2014/main" id="{125E1361-8EE7-6F17-219E-094270F49676}"/>
+              </a:ext>
+            </a:extLst>
+          </p:cNvPr>
+          <p:cNvCxnSpPr>
+            <a:cxnSpLocks/>
+          </p:cNvCxnSpPr>
+          <p:nvPr/>
+        </p:nvCxnSpPr>
+        <p:spPr>
+          <a:xfrm flipH="1">
+            <a:off x="8938260" y="4330853"/>
+            <a:ext cx="952500" cy="990147"/>
+          </a:xfrm>
+          <a:prstGeom prst="line">
+            <a:avLst/>
+          </a:prstGeom>
+          <a:ln>
+            <a:solidFill>
+              <a:srgbClr val="FFC000"/>
+            </a:solidFill>
+          </a:ln>
+        </p:spPr>
+        <p:style>
+          <a:lnRef idx="2">
+            <a:schemeClr val="accent1"/>
+          </a:lnRef>
+          <a:fillRef idx="0">
+            <a:schemeClr val="accent1"/>
+          </a:fillRef>
+          <a:effectRef idx="1">
+            <a:schemeClr val="accent1"/>
+          </a:effectRef>
+          <a:fontRef idx="minor">
+            <a:schemeClr val="tx1"/>
+          </a:fontRef>
+        </p:style>
+      </p:cxnSp>
+    </p:spTree>
+    <p:extLst>
+      <p:ext uri="{BB962C8B-B14F-4D97-AF65-F5344CB8AC3E}">
+        <p14:creationId xmlns:p14="http://schemas.microsoft.com/office/powerpoint/2010/main" val="1491034000"/>
       </p:ext>
     </p:extLst>
   </p:cSld>

</xml_diff>